<commit_message>
optimization(24-27, 131-146, 226-250, 491-510, 512-528) create def mini_game()
</commit_message>
<xml_diff>
--- a/The Walls (презентация).PPTX
+++ b/The Walls (презентация).PPTX
@@ -349,7 +349,7 @@
           <a:p>
             <a:fld id="{98DC367A-F48C-485A-B3C4-EEBE12D827A9}" type="datetimeFigureOut">
               <a:rPr lang="ru-RU" smtClean="0"/>
-              <a:t>18.01.2023</a:t>
+              <a:t>03.02.2023</a:t>
             </a:fld>
             <a:endParaRPr lang="ru-RU"/>
           </a:p>
@@ -683,7 +683,7 @@
           <a:p>
             <a:fld id="{98DC367A-F48C-485A-B3C4-EEBE12D827A9}" type="datetimeFigureOut">
               <a:rPr lang="ru-RU" smtClean="0"/>
-              <a:t>18.01.2023</a:t>
+              <a:t>03.02.2023</a:t>
             </a:fld>
             <a:endParaRPr lang="ru-RU"/>
           </a:p>
@@ -961,7 +961,7 @@
           <a:p>
             <a:fld id="{98DC367A-F48C-485A-B3C4-EEBE12D827A9}" type="datetimeFigureOut">
               <a:rPr lang="ru-RU" smtClean="0"/>
-              <a:t>18.01.2023</a:t>
+              <a:t>03.02.2023</a:t>
             </a:fld>
             <a:endParaRPr lang="ru-RU"/>
           </a:p>
@@ -1529,7 +1529,7 @@
           <a:p>
             <a:fld id="{98DC367A-F48C-485A-B3C4-EEBE12D827A9}" type="datetimeFigureOut">
               <a:rPr lang="ru-RU" smtClean="0"/>
-              <a:t>18.01.2023</a:t>
+              <a:t>03.02.2023</a:t>
             </a:fld>
             <a:endParaRPr lang="ru-RU"/>
           </a:p>
@@ -1807,7 +1807,7 @@
           <a:p>
             <a:fld id="{98DC367A-F48C-485A-B3C4-EEBE12D827A9}" type="datetimeFigureOut">
               <a:rPr lang="ru-RU" smtClean="0"/>
-              <a:t>18.01.2023</a:t>
+              <a:t>03.02.2023</a:t>
             </a:fld>
             <a:endParaRPr lang="ru-RU"/>
           </a:p>
@@ -2369,7 +2369,7 @@
           <a:p>
             <a:fld id="{98DC367A-F48C-485A-B3C4-EEBE12D827A9}" type="datetimeFigureOut">
               <a:rPr lang="ru-RU" smtClean="0"/>
-              <a:t>18.01.2023</a:t>
+              <a:t>03.02.2023</a:t>
             </a:fld>
             <a:endParaRPr lang="ru-RU"/>
           </a:p>
@@ -2696,7 +2696,7 @@
           <a:p>
             <a:fld id="{98DC367A-F48C-485A-B3C4-EEBE12D827A9}" type="datetimeFigureOut">
               <a:rPr lang="ru-RU" smtClean="0"/>
-              <a:t>18.01.2023</a:t>
+              <a:t>03.02.2023</a:t>
             </a:fld>
             <a:endParaRPr lang="ru-RU"/>
           </a:p>
@@ -2873,7 +2873,7 @@
           <a:p>
             <a:fld id="{98DC367A-F48C-485A-B3C4-EEBE12D827A9}" type="datetimeFigureOut">
               <a:rPr lang="ru-RU" smtClean="0"/>
-              <a:t>18.01.2023</a:t>
+              <a:t>03.02.2023</a:t>
             </a:fld>
             <a:endParaRPr lang="ru-RU"/>
           </a:p>
@@ -3123,7 +3123,7 @@
           <a:p>
             <a:fld id="{98DC367A-F48C-485A-B3C4-EEBE12D827A9}" type="datetimeFigureOut">
               <a:rPr lang="ru-RU" smtClean="0"/>
-              <a:t>18.01.2023</a:t>
+              <a:t>03.02.2023</a:t>
             </a:fld>
             <a:endParaRPr lang="ru-RU"/>
           </a:p>
@@ -3335,7 +3335,7 @@
           <a:p>
             <a:fld id="{98DC367A-F48C-485A-B3C4-EEBE12D827A9}" type="datetimeFigureOut">
               <a:rPr lang="ru-RU" smtClean="0"/>
-              <a:t>18.01.2023</a:t>
+              <a:t>03.02.2023</a:t>
             </a:fld>
             <a:endParaRPr lang="ru-RU"/>
           </a:p>
@@ -3623,7 +3623,7 @@
           <a:p>
             <a:fld id="{98DC367A-F48C-485A-B3C4-EEBE12D827A9}" type="datetimeFigureOut">
               <a:rPr lang="ru-RU" smtClean="0"/>
-              <a:t>18.01.2023</a:t>
+              <a:t>03.02.2023</a:t>
             </a:fld>
             <a:endParaRPr lang="ru-RU"/>
           </a:p>
@@ -3901,7 +3901,7 @@
           <a:p>
             <a:fld id="{98DC367A-F48C-485A-B3C4-EEBE12D827A9}" type="datetimeFigureOut">
               <a:rPr lang="ru-RU" smtClean="0"/>
-              <a:t>18.01.2023</a:t>
+              <a:t>03.02.2023</a:t>
             </a:fld>
             <a:endParaRPr lang="ru-RU"/>
           </a:p>
@@ -4287,7 +4287,7 @@
           <a:p>
             <a:fld id="{98DC367A-F48C-485A-B3C4-EEBE12D827A9}" type="datetimeFigureOut">
               <a:rPr lang="ru-RU" smtClean="0"/>
-              <a:t>18.01.2023</a:t>
+              <a:t>03.02.2023</a:t>
             </a:fld>
             <a:endParaRPr lang="ru-RU"/>
           </a:p>
@@ -4447,7 +4447,7 @@
           <a:p>
             <a:fld id="{98DC367A-F48C-485A-B3C4-EEBE12D827A9}" type="datetimeFigureOut">
               <a:rPr lang="ru-RU" smtClean="0"/>
-              <a:t>18.01.2023</a:t>
+              <a:t>03.02.2023</a:t>
             </a:fld>
             <a:endParaRPr lang="ru-RU"/>
           </a:p>
@@ -4584,7 +4584,7 @@
           <a:p>
             <a:fld id="{98DC367A-F48C-485A-B3C4-EEBE12D827A9}" type="datetimeFigureOut">
               <a:rPr lang="ru-RU" smtClean="0"/>
-              <a:t>18.01.2023</a:t>
+              <a:t>03.02.2023</a:t>
             </a:fld>
             <a:endParaRPr lang="ru-RU"/>
           </a:p>
@@ -4881,7 +4881,7 @@
           <a:p>
             <a:fld id="{98DC367A-F48C-485A-B3C4-EEBE12D827A9}" type="datetimeFigureOut">
               <a:rPr lang="ru-RU" smtClean="0"/>
-              <a:t>18.01.2023</a:t>
+              <a:t>03.02.2023</a:t>
             </a:fld>
             <a:endParaRPr lang="ru-RU"/>
           </a:p>
@@ -5217,7 +5217,7 @@
           <a:p>
             <a:fld id="{98DC367A-F48C-485A-B3C4-EEBE12D827A9}" type="datetimeFigureOut">
               <a:rPr lang="ru-RU" smtClean="0"/>
-              <a:t>18.01.2023</a:t>
+              <a:t>03.02.2023</a:t>
             </a:fld>
             <a:endParaRPr lang="ru-RU"/>
           </a:p>
@@ -5443,7 +5443,7 @@
           <a:p>
             <a:fld id="{98DC367A-F48C-485A-B3C4-EEBE12D827A9}" type="datetimeFigureOut">
               <a:rPr lang="ru-RU" smtClean="0"/>
-              <a:t>18.01.2023</a:t>
+              <a:t>03.02.2023</a:t>
             </a:fld>
             <a:endParaRPr lang="ru-RU"/>
           </a:p>
@@ -6942,12 +6942,74 @@
           </a:prstGeom>
         </p:spPr>
       </p:pic>
+      <p:sp>
+        <p:nvSpPr>
+          <p:cNvPr id="15" name="TextBox 14">
+            <a:extLst>
+              <a:ext uri="{FF2B5EF4-FFF2-40B4-BE49-F238E27FC236}">
+                <a16:creationId xmlns:a16="http://schemas.microsoft.com/office/drawing/2014/main" id="{B393C302-66EE-CB32-EE3D-D1D21E0F08AE}"/>
+              </a:ext>
+            </a:extLst>
+          </p:cNvPr>
+          <p:cNvSpPr txBox="1"/>
+          <p:nvPr/>
+        </p:nvSpPr>
+        <p:spPr>
+          <a:xfrm>
+            <a:off x="782471" y="629378"/>
+            <a:ext cx="6094520" cy="1754326"/>
+          </a:xfrm>
+          <a:prstGeom prst="rect">
+            <a:avLst/>
+          </a:prstGeom>
+          <a:noFill/>
+        </p:spPr>
+        <p:txBody>
+          <a:bodyPr wrap="square">
+            <a:spAutoFit/>
+          </a:bodyPr>
+          <a:lstStyle/>
+          <a:p>
+            <a:r>
+              <a:rPr lang="ru-RU" b="1" i="1" dirty="0"/>
+              <a:t>Помощь.</a:t>
+            </a:r>
+          </a:p>
+          <a:p>
+            <a:r>
+              <a:rPr lang="ru-RU" dirty="0"/>
+              <a:t>Небольшая документация, содержащая всю информацию о игре.</a:t>
+            </a:r>
+          </a:p>
+          <a:p>
+            <a:endParaRPr lang="ru-RU" dirty="0"/>
+          </a:p>
+          <a:p>
+            <a:r>
+              <a:rPr lang="ru-RU" dirty="0"/>
+              <a:t>Запуск прописан в функции </a:t>
+            </a:r>
+            <a:r>
+              <a:rPr lang="en-US" dirty="0"/>
+              <a:t>menu()</a:t>
+            </a:r>
+            <a:endParaRPr lang="ru-RU" dirty="0"/>
+          </a:p>
+          <a:p>
+            <a:r>
+              <a:rPr lang="ru-RU" i="1" dirty="0"/>
+              <a:t>Установлена фоновая музыка стартового окна.</a:t>
+            </a:r>
+            <a:endParaRPr lang="ru-RU" dirty="0"/>
+          </a:p>
+        </p:txBody>
+      </p:sp>
       <p:pic>
         <p:nvPicPr>
-          <p:cNvPr id="11" name="Рисунок 10">
+          <p:cNvPr id="3" name="Рисунок 2">
             <a:extLst>
               <a:ext uri="{FF2B5EF4-FFF2-40B4-BE49-F238E27FC236}">
-                <a16:creationId xmlns:a16="http://schemas.microsoft.com/office/drawing/2014/main" id="{5AB4333C-AE9F-9BDB-0E2E-C6EC3CF4AB17}"/>
+                <a16:creationId xmlns:a16="http://schemas.microsoft.com/office/drawing/2014/main" id="{C27BE46F-5C1C-F356-E0E0-2AFE9A5A4ACF}"/>
               </a:ext>
             </a:extLst>
           </p:cNvPr>
@@ -6970,76 +7032,14 @@
         </p:blipFill>
         <p:spPr>
           <a:xfrm>
-            <a:off x="7990574" y="2722822"/>
-            <a:ext cx="3313973" cy="3526067"/>
+            <a:off x="8037741" y="2722822"/>
+            <a:ext cx="3505800" cy="3505800"/>
           </a:xfrm>
           <a:prstGeom prst="rect">
             <a:avLst/>
           </a:prstGeom>
         </p:spPr>
       </p:pic>
-      <p:sp>
-        <p:nvSpPr>
-          <p:cNvPr id="15" name="TextBox 14">
-            <a:extLst>
-              <a:ext uri="{FF2B5EF4-FFF2-40B4-BE49-F238E27FC236}">
-                <a16:creationId xmlns:a16="http://schemas.microsoft.com/office/drawing/2014/main" id="{B393C302-66EE-CB32-EE3D-D1D21E0F08AE}"/>
-              </a:ext>
-            </a:extLst>
-          </p:cNvPr>
-          <p:cNvSpPr txBox="1"/>
-          <p:nvPr/>
-        </p:nvSpPr>
-        <p:spPr>
-          <a:xfrm>
-            <a:off x="782471" y="629378"/>
-            <a:ext cx="6094520" cy="1754326"/>
-          </a:xfrm>
-          <a:prstGeom prst="rect">
-            <a:avLst/>
-          </a:prstGeom>
-          <a:noFill/>
-        </p:spPr>
-        <p:txBody>
-          <a:bodyPr wrap="square">
-            <a:spAutoFit/>
-          </a:bodyPr>
-          <a:lstStyle/>
-          <a:p>
-            <a:r>
-              <a:rPr lang="ru-RU" b="1" i="1" dirty="0"/>
-              <a:t>Помощь.</a:t>
-            </a:r>
-          </a:p>
-          <a:p>
-            <a:r>
-              <a:rPr lang="ru-RU" dirty="0"/>
-              <a:t>Небольшая документация, содержащая всю информацию о игре.</a:t>
-            </a:r>
-          </a:p>
-          <a:p>
-            <a:endParaRPr lang="ru-RU" dirty="0"/>
-          </a:p>
-          <a:p>
-            <a:r>
-              <a:rPr lang="ru-RU" dirty="0"/>
-              <a:t>Запуск прописан в функции </a:t>
-            </a:r>
-            <a:r>
-              <a:rPr lang="en-US" dirty="0"/>
-              <a:t>menu()</a:t>
-            </a:r>
-            <a:endParaRPr lang="ru-RU" dirty="0"/>
-          </a:p>
-          <a:p>
-            <a:r>
-              <a:rPr lang="ru-RU" i="1" dirty="0"/>
-              <a:t>Установлена фоновая музыка стартового окна.</a:t>
-            </a:r>
-            <a:endParaRPr lang="ru-RU" dirty="0"/>
-          </a:p>
-        </p:txBody>
-      </p:sp>
     </p:spTree>
     <p:extLst>
       <p:ext uri="{BB962C8B-B14F-4D97-AF65-F5344CB8AC3E}">

</xml_diff>